<commit_message>
Add Week 10 materials
</commit_message>
<xml_diff>
--- a/Week 8/Week 8.pptx
+++ b/Week 8/Week 8.pptx
@@ -4062,6 +4062,13 @@
   <p:clrMapOvr>
     <a:masterClrMapping/>
   </p:clrMapOvr>
+  <p:timing>
+    <p:tnLst>
+      <p:par>
+        <p:cTn xmlns:p14="http://schemas.microsoft.com/office/powerpoint/2010/main" id="1" dur="indefinite" restart="never" nodeType="tmRoot"/>
+      </p:par>
+    </p:tnLst>
+  </p:timing>
 </p:sld>
 </file>
 
@@ -4292,6 +4299,13 @@
   <p:clrMapOvr>
     <a:masterClrMapping/>
   </p:clrMapOvr>
+  <p:timing>
+    <p:tnLst>
+      <p:par>
+        <p:cTn xmlns:p14="http://schemas.microsoft.com/office/powerpoint/2010/main" id="1" dur="indefinite" restart="never" nodeType="tmRoot"/>
+      </p:par>
+    </p:tnLst>
+  </p:timing>
 </p:sld>
 </file>
 
@@ -4364,6 +4378,13 @@
   <p:clrMapOvr>
     <a:masterClrMapping/>
   </p:clrMapOvr>
+  <p:timing>
+    <p:tnLst>
+      <p:par>
+        <p:cTn xmlns:p14="http://schemas.microsoft.com/office/powerpoint/2010/main" id="1" dur="indefinite" restart="never" nodeType="tmRoot"/>
+      </p:par>
+    </p:tnLst>
+  </p:timing>
 </p:sld>
 </file>
 
@@ -5676,6 +5697,13 @@
   <p:clrMapOvr>
     <a:masterClrMapping/>
   </p:clrMapOvr>
+  <p:timing>
+    <p:tnLst>
+      <p:par>
+        <p:cTn xmlns:p14="http://schemas.microsoft.com/office/powerpoint/2010/main" id="1" dur="indefinite" restart="never" nodeType="tmRoot"/>
+      </p:par>
+    </p:tnLst>
+  </p:timing>
 </p:sld>
 </file>
 
@@ -5935,7 +5963,7 @@
           <a:graphicData uri="http://schemas.openxmlformats.org/presentationml/2006/ole">
             <mc:AlternateContent xmlns:mc="http://schemas.openxmlformats.org/markup-compatibility/2006">
               <mc:Choice xmlns:v="urn:schemas-microsoft-com:vml" Requires="v">
-                <p:oleObj spid="_x0000_s1081" name="Equation" r:id="rId3" imgW="1524000" imgH="457200" progId="Equation.3">
+                <p:oleObj spid="_x0000_s1085" name="Equation" r:id="rId3" imgW="1524000" imgH="457200" progId="Equation.3">
                   <p:embed/>
                 </p:oleObj>
               </mc:Choice>
@@ -5992,7 +6020,7 @@
           <a:graphicData uri="http://schemas.openxmlformats.org/presentationml/2006/ole">
             <mc:AlternateContent xmlns:mc="http://schemas.openxmlformats.org/markup-compatibility/2006">
               <mc:Choice xmlns:v="urn:schemas-microsoft-com:vml" Requires="v">
-                <p:oleObj spid="_x0000_s1082" name="Equation" r:id="rId5" imgW="165100" imgH="215900" progId="Equation.3">
+                <p:oleObj spid="_x0000_s1086" name="Equation" r:id="rId5" imgW="165100" imgH="215900" progId="Equation.3">
                   <p:embed/>
                 </p:oleObj>
               </mc:Choice>
@@ -6346,7 +6374,7 @@
           <a:graphicData uri="http://schemas.openxmlformats.org/presentationml/2006/ole">
             <mc:AlternateContent xmlns:mc="http://schemas.openxmlformats.org/markup-compatibility/2006">
               <mc:Choice xmlns:v="urn:schemas-microsoft-com:vml" Requires="v">
-                <p:oleObj spid="_x0000_s2087" name="Equation" r:id="rId3" imgW="1524000" imgH="457200" progId="Equation.3">
+                <p:oleObj spid="_x0000_s2099" name="Equation" r:id="rId3" imgW="1524000" imgH="457200" progId="Equation.3">
                   <p:embed/>
                 </p:oleObj>
               </mc:Choice>
@@ -6403,7 +6431,7 @@
           <a:graphicData uri="http://schemas.openxmlformats.org/presentationml/2006/ole">
             <mc:AlternateContent xmlns:mc="http://schemas.openxmlformats.org/markup-compatibility/2006">
               <mc:Choice xmlns:v="urn:schemas-microsoft-com:vml" Requires="v">
-                <p:oleObj spid="_x0000_s2088" name="Equation" r:id="rId5" imgW="787400" imgH="215900" progId="Equation.3">
+                <p:oleObj spid="_x0000_s2100" name="Equation" r:id="rId5" imgW="787400" imgH="215900" progId="Equation.3">
                   <p:embed/>
                 </p:oleObj>
               </mc:Choice>
@@ -6460,7 +6488,7 @@
           <a:graphicData uri="http://schemas.openxmlformats.org/presentationml/2006/ole">
             <mc:AlternateContent xmlns:mc="http://schemas.openxmlformats.org/markup-compatibility/2006">
               <mc:Choice xmlns:v="urn:schemas-microsoft-com:vml" Requires="v">
-                <p:oleObj spid="_x0000_s2089" name="Equation" r:id="rId7" imgW="177800" imgH="215900" progId="Equation.3">
+                <p:oleObj spid="_x0000_s2101" name="Equation" r:id="rId7" imgW="177800" imgH="215900" progId="Equation.3">
                   <p:embed/>
                 </p:oleObj>
               </mc:Choice>
@@ -6517,7 +6545,7 @@
           <a:graphicData uri="http://schemas.openxmlformats.org/presentationml/2006/ole">
             <mc:AlternateContent xmlns:mc="http://schemas.openxmlformats.org/markup-compatibility/2006">
               <mc:Choice xmlns:v="urn:schemas-microsoft-com:vml" Requires="v">
-                <p:oleObj spid="_x0000_s2090" name="Equation" r:id="rId9" imgW="114300" imgH="139700" progId="Equation.3">
+                <p:oleObj spid="_x0000_s2102" name="Equation" r:id="rId9" imgW="114300" imgH="139700" progId="Equation.3">
                   <p:embed/>
                 </p:oleObj>
               </mc:Choice>
@@ -6574,7 +6602,7 @@
           <a:graphicData uri="http://schemas.openxmlformats.org/presentationml/2006/ole">
             <mc:AlternateContent xmlns:mc="http://schemas.openxmlformats.org/markup-compatibility/2006">
               <mc:Choice xmlns:v="urn:schemas-microsoft-com:vml" Requires="v">
-                <p:oleObj spid="_x0000_s2091" name="Equation" r:id="rId11" imgW="139700" imgH="139700" progId="Equation.3">
+                <p:oleObj spid="_x0000_s2103" name="Equation" r:id="rId11" imgW="139700" imgH="139700" progId="Equation.3">
                   <p:embed/>
                 </p:oleObj>
               </mc:Choice>
@@ -6631,7 +6659,7 @@
           <a:graphicData uri="http://schemas.openxmlformats.org/presentationml/2006/ole">
             <mc:AlternateContent xmlns:mc="http://schemas.openxmlformats.org/markup-compatibility/2006">
               <mc:Choice xmlns:v="urn:schemas-microsoft-com:vml" Requires="v">
-                <p:oleObj spid="_x0000_s2092" name="Equation" r:id="rId13" imgW="203200" imgH="215900" progId="Equation.3">
+                <p:oleObj spid="_x0000_s2104" name="Equation" r:id="rId13" imgW="203200" imgH="215900" progId="Equation.3">
                   <p:embed/>
                 </p:oleObj>
               </mc:Choice>
@@ -6755,6 +6783,13 @@
   <p:clrMapOvr>
     <a:masterClrMapping/>
   </p:clrMapOvr>
+  <p:timing>
+    <p:tnLst>
+      <p:par>
+        <p:cTn xmlns:p14="http://schemas.microsoft.com/office/powerpoint/2010/main" id="1" dur="indefinite" restart="never" nodeType="tmRoot"/>
+      </p:par>
+    </p:tnLst>
+  </p:timing>
 </p:sld>
 </file>
 
@@ -6826,14 +6861,18 @@
             </a:r>
             <a:r>
               <a:rPr lang="en-US" dirty="0" smtClean="0"/>
-              <a:t>Thursday the </a:t>
-            </a:r>
-            <a:r>
-              <a:rPr lang="en-US" dirty="0" smtClean="0"/>
-              <a:t>18</a:t>
-            </a:r>
-            <a:r>
-              <a:rPr lang="en-US" baseline="30000" dirty="0" smtClean="0"/>
+              <a:t>Thursday </a:t>
+            </a:r>
+            <a:r>
+              <a:rPr lang="en-US" smtClean="0"/>
+              <a:t>the </a:t>
+            </a:r>
+            <a:r>
+              <a:rPr lang="en-US" smtClean="0"/>
+              <a:t>19</a:t>
+            </a:r>
+            <a:r>
+              <a:rPr lang="en-US" baseline="30000" smtClean="0"/>
               <a:t>th</a:t>
             </a:r>
             <a:r>
@@ -7353,6 +7392,13 @@
   <p:clrMapOvr>
     <a:masterClrMapping/>
   </p:clrMapOvr>
+  <p:timing>
+    <p:tnLst>
+      <p:par>
+        <p:cTn xmlns:p14="http://schemas.microsoft.com/office/powerpoint/2010/main" id="1" dur="indefinite" restart="never" nodeType="tmRoot"/>
+      </p:par>
+    </p:tnLst>
+  </p:timing>
 </p:sld>
 </file>
 
@@ -7501,6 +7547,13 @@
   <p:clrMapOvr>
     <a:masterClrMapping/>
   </p:clrMapOvr>
+  <p:timing>
+    <p:tnLst>
+      <p:par>
+        <p:cTn xmlns:p14="http://schemas.microsoft.com/office/powerpoint/2010/main" id="1" dur="indefinite" restart="never" nodeType="tmRoot"/>
+      </p:par>
+    </p:tnLst>
+  </p:timing>
 </p:sld>
 </file>
 
@@ -7577,6 +7630,13 @@
   <p:clrMapOvr>
     <a:masterClrMapping/>
   </p:clrMapOvr>
+  <p:timing>
+    <p:tnLst>
+      <p:par>
+        <p:cTn xmlns:p14="http://schemas.microsoft.com/office/powerpoint/2010/main" id="1" dur="indefinite" restart="never" nodeType="tmRoot"/>
+      </p:par>
+    </p:tnLst>
+  </p:timing>
 </p:sld>
 </file>
 

</xml_diff>